<commit_message>
commit ppt RAD Python atualização 26082022
</commit_message>
<xml_diff>
--- a/01 Classes/Curso de Férias Programação Python - 04Jul2022.pptx
+++ b/01 Classes/Curso de Férias Programação Python - 04Jul2022.pptx
@@ -5786,6 +5786,21 @@
               </a:rPr>
               <a:t>Programação Python</a:t>
             </a:r>
+            <a:br>
+              <a:rPr lang="pt-BR" sz="4800" b="1" dirty="0">
+                <a:solidFill>
+                  <a:schemeClr val="bg1"/>
+                </a:solidFill>
+              </a:rPr>
+            </a:br>
+            <a:r>
+              <a:rPr lang="pt-BR" sz="4800" b="1" dirty="0">
+                <a:solidFill>
+                  <a:schemeClr val="bg1"/>
+                </a:solidFill>
+              </a:rPr>
+              <a:t>Curso de Férias</a:t>
+            </a:r>
           </a:p>
         </p:txBody>
       </p:sp>
@@ -16159,13 +16174,33 @@
           <a:lstStyle/>
           <a:p>
             <a:r>
-              <a:rPr lang="pt-BR" sz="4800" b="1" dirty="0">
+              <a:rPr lang="pt-BR" sz="4800" b="1">
                 <a:solidFill>
                   <a:schemeClr val="bg1"/>
                 </a:solidFill>
               </a:rPr>
               <a:t>Programação Python</a:t>
             </a:r>
+            <a:br>
+              <a:rPr lang="pt-BR" sz="4800" b="1">
+                <a:solidFill>
+                  <a:schemeClr val="bg1"/>
+                </a:solidFill>
+              </a:rPr>
+            </a:br>
+            <a:r>
+              <a:rPr lang="pt-BR" sz="4800" b="1">
+                <a:solidFill>
+                  <a:schemeClr val="bg1"/>
+                </a:solidFill>
+              </a:rPr>
+              <a:t>Curso de Férias</a:t>
+            </a:r>
+            <a:endParaRPr lang="pt-BR" sz="4800" b="1" dirty="0">
+              <a:solidFill>
+                <a:schemeClr val="bg1"/>
+              </a:solidFill>
+            </a:endParaRPr>
           </a:p>
         </p:txBody>
       </p:sp>

</xml_diff>